<commit_message>
start adding Build related slides
</commit_message>
<xml_diff>
--- a/Build 2016 recap.pptx
+++ b/Build 2016 recap.pptx
@@ -5,10 +5,20 @@
     <p:sldMasterId id="2147483648" r:id="rId1"/>
   </p:sldMasterIdLst>
   <p:notesMasterIdLst>
-    <p:notesMasterId r:id="rId3"/>
+    <p:notesMasterId r:id="rId13"/>
   </p:notesMasterIdLst>
   <p:sldIdLst>
     <p:sldId id="256" r:id="rId2"/>
+    <p:sldId id="257" r:id="rId3"/>
+    <p:sldId id="258" r:id="rId4"/>
+    <p:sldId id="259" r:id="rId5"/>
+    <p:sldId id="260" r:id="rId6"/>
+    <p:sldId id="261" r:id="rId7"/>
+    <p:sldId id="262" r:id="rId8"/>
+    <p:sldId id="263" r:id="rId9"/>
+    <p:sldId id="264" r:id="rId10"/>
+    <p:sldId id="265" r:id="rId11"/>
+    <p:sldId id="266" r:id="rId12"/>
   </p:sldIdLst>
   <p:sldSz cx="12192000" cy="6858000"/>
   <p:notesSz cx="6858000" cy="9144000"/>
@@ -6151,7 +6161,11 @@
           <a:p>
             <a:r>
               <a:rPr lang="en-US" dirty="0" smtClean="0"/>
-              <a:t>Great Design</a:t>
+              <a:t>//build/</a:t>
+            </a:r>
+            <a:r>
+              <a:rPr lang="en-US" dirty="0" smtClean="0"/>
+              <a:t/>
             </a:r>
             <a:br>
               <a:rPr lang="en-US" dirty="0" smtClean="0"/>
@@ -6176,62 +6190,18 @@
           <a:lstStyle/>
           <a:p>
             <a:r>
-              <a:rPr lang="en-US" dirty="0" smtClean="0"/>
-              <a:t>The Science of</a:t>
-            </a:r>
-            <a:endParaRPr lang="en-US" dirty="0"/>
-          </a:p>
-        </p:txBody>
-      </p:sp>
-      <p:sp>
-        <p:nvSpPr>
-          <p:cNvPr id="4" name="TextBox 3"/>
-          <p:cNvSpPr txBox="1"/>
-          <p:nvPr/>
-        </p:nvSpPr>
-        <p:spPr>
-          <a:xfrm>
-            <a:off x="333633" y="469556"/>
-            <a:ext cx="5461860" cy="923330"/>
-          </a:xfrm>
-          <a:prstGeom prst="rect">
-            <a:avLst/>
-          </a:prstGeom>
-          <a:noFill/>
-        </p:spPr>
-        <p:txBody>
-          <a:bodyPr wrap="square" rtlCol="0">
-            <a:spAutoFit/>
-          </a:bodyPr>
-          <a:lstStyle/>
-          <a:p>
-            <a:r>
-              <a:rPr lang="en-US" dirty="0" smtClean="0"/>
-              <a:t>Based on </a:t>
-            </a:r>
-            <a:r>
-              <a:rPr lang="en-US" dirty="0" err="1" smtClean="0"/>
-              <a:t>Anglebrackets</a:t>
-            </a:r>
-            <a:r>
-              <a:rPr lang="en-US" dirty="0" smtClean="0"/>
-              <a:t> 2015 pre-conference workshop presented by Mark Miller (@</a:t>
-            </a:r>
-            <a:r>
-              <a:rPr lang="en-US" dirty="0" err="1" smtClean="0"/>
-              <a:t>greatui</a:t>
-            </a:r>
-            <a:r>
-              <a:rPr lang="en-US" dirty="0" smtClean="0"/>
-              <a:t>)</a:t>
-            </a:r>
-          </a:p>
-          <a:p>
-            <a:r>
-              <a:rPr lang="en-US" dirty="0" smtClean="0"/>
-              <a:t>http://www.sgui.com</a:t>
-            </a:r>
-            <a:endParaRPr lang="en-US" dirty="0"/>
+              <a:rPr lang="en-US" dirty="0" smtClean="0">
+                <a:solidFill>
+                  <a:schemeClr val="tx1"/>
+                </a:solidFill>
+              </a:rPr>
+              <a:t>Microsoft 2016</a:t>
+            </a:r>
+            <a:endParaRPr lang="en-US" dirty="0">
+              <a:solidFill>
+                <a:schemeClr val="tx1"/>
+              </a:solidFill>
+            </a:endParaRPr>
           </a:p>
         </p:txBody>
       </p:sp>
@@ -6252,6 +6222,799 @@
       </p:par>
     </p:tnLst>
   </p:timing>
+</p:sld>
+</file>
+
+<file path=ppt/slides/slide10.xml><?xml version="1.0" encoding="utf-8"?>
+<p:sld xmlns:a="http://schemas.openxmlformats.org/drawingml/2006/main" xmlns:r="http://schemas.openxmlformats.org/officeDocument/2006/relationships" xmlns:p="http://schemas.openxmlformats.org/presentationml/2006/main">
+  <p:cSld>
+    <p:spTree>
+      <p:nvGrpSpPr>
+        <p:cNvPr id="1" name=""/>
+        <p:cNvGrpSpPr/>
+        <p:nvPr/>
+      </p:nvGrpSpPr>
+      <p:grpSpPr>
+        <a:xfrm>
+          <a:off x="0" y="0"/>
+          <a:ext cx="0" cy="0"/>
+          <a:chOff x="0" y="0"/>
+          <a:chExt cx="0" cy="0"/>
+        </a:xfrm>
+      </p:grpSpPr>
+      <p:sp>
+        <p:nvSpPr>
+          <p:cNvPr id="2" name="Title 1"/>
+          <p:cNvSpPr>
+            <a:spLocks noGrp="1"/>
+          </p:cNvSpPr>
+          <p:nvPr>
+            <p:ph type="title"/>
+          </p:nvPr>
+        </p:nvSpPr>
+        <p:spPr/>
+        <p:txBody>
+          <a:bodyPr/>
+          <a:lstStyle/>
+          <a:p>
+            <a:r>
+              <a:rPr lang="en-US" dirty="0" smtClean="0"/>
+              <a:t>Modern Office </a:t>
+            </a:r>
+            <a:r>
+              <a:rPr lang="en-US" dirty="0" err="1" smtClean="0"/>
+              <a:t>Addins</a:t>
+            </a:r>
+            <a:endParaRPr lang="en-US" dirty="0"/>
+          </a:p>
+        </p:txBody>
+      </p:sp>
+      <p:sp>
+        <p:nvSpPr>
+          <p:cNvPr id="3" name="Content Placeholder 2"/>
+          <p:cNvSpPr>
+            <a:spLocks noGrp="1"/>
+          </p:cNvSpPr>
+          <p:nvPr>
+            <p:ph idx="1"/>
+          </p:nvPr>
+        </p:nvSpPr>
+        <p:spPr/>
+        <p:txBody>
+          <a:bodyPr/>
+          <a:lstStyle/>
+          <a:p>
+            <a:endParaRPr lang="en-US"/>
+          </a:p>
+        </p:txBody>
+      </p:sp>
+    </p:spTree>
+    <p:extLst>
+      <p:ext uri="{BB962C8B-B14F-4D97-AF65-F5344CB8AC3E}">
+        <p14:creationId xmlns:p14="http://schemas.microsoft.com/office/powerpoint/2010/main" val="584393347"/>
+      </p:ext>
+    </p:extLst>
+  </p:cSld>
+  <p:clrMapOvr>
+    <a:masterClrMapping/>
+  </p:clrMapOvr>
+</p:sld>
+</file>
+
+<file path=ppt/slides/slide11.xml><?xml version="1.0" encoding="utf-8"?>
+<p:sld xmlns:a="http://schemas.openxmlformats.org/drawingml/2006/main" xmlns:r="http://schemas.openxmlformats.org/officeDocument/2006/relationships" xmlns:p="http://schemas.openxmlformats.org/presentationml/2006/main">
+  <p:cSld>
+    <p:spTree>
+      <p:nvGrpSpPr>
+        <p:cNvPr id="1" name=""/>
+        <p:cNvGrpSpPr/>
+        <p:nvPr/>
+      </p:nvGrpSpPr>
+      <p:grpSpPr>
+        <a:xfrm>
+          <a:off x="0" y="0"/>
+          <a:ext cx="0" cy="0"/>
+          <a:chOff x="0" y="0"/>
+          <a:chExt cx="0" cy="0"/>
+        </a:xfrm>
+      </p:grpSpPr>
+      <p:sp>
+        <p:nvSpPr>
+          <p:cNvPr id="2" name="Title 1"/>
+          <p:cNvSpPr>
+            <a:spLocks noGrp="1"/>
+          </p:cNvSpPr>
+          <p:nvPr>
+            <p:ph type="title"/>
+          </p:nvPr>
+        </p:nvSpPr>
+        <p:spPr/>
+        <p:txBody>
+          <a:bodyPr/>
+          <a:lstStyle/>
+          <a:p>
+            <a:r>
+              <a:rPr lang="en-US" dirty="0" smtClean="0"/>
+              <a:t>Xbox Dev Mode</a:t>
+            </a:r>
+            <a:endParaRPr lang="en-US" dirty="0"/>
+          </a:p>
+        </p:txBody>
+      </p:sp>
+      <p:sp>
+        <p:nvSpPr>
+          <p:cNvPr id="3" name="Content Placeholder 2"/>
+          <p:cNvSpPr>
+            <a:spLocks noGrp="1"/>
+          </p:cNvSpPr>
+          <p:nvPr>
+            <p:ph idx="1"/>
+          </p:nvPr>
+        </p:nvSpPr>
+        <p:spPr/>
+        <p:txBody>
+          <a:bodyPr/>
+          <a:lstStyle/>
+          <a:p>
+            <a:endParaRPr lang="en-US"/>
+          </a:p>
+        </p:txBody>
+      </p:sp>
+    </p:spTree>
+    <p:extLst>
+      <p:ext uri="{BB962C8B-B14F-4D97-AF65-F5344CB8AC3E}">
+        <p14:creationId xmlns:p14="http://schemas.microsoft.com/office/powerpoint/2010/main" val="727712613"/>
+      </p:ext>
+    </p:extLst>
+  </p:cSld>
+  <p:clrMapOvr>
+    <a:masterClrMapping/>
+  </p:clrMapOvr>
+</p:sld>
+</file>
+
+<file path=ppt/slides/slide2.xml><?xml version="1.0" encoding="utf-8"?>
+<p:sld xmlns:a="http://schemas.openxmlformats.org/drawingml/2006/main" xmlns:r="http://schemas.openxmlformats.org/officeDocument/2006/relationships" xmlns:p="http://schemas.openxmlformats.org/presentationml/2006/main">
+  <p:cSld>
+    <p:spTree>
+      <p:nvGrpSpPr>
+        <p:cNvPr id="1" name=""/>
+        <p:cNvGrpSpPr/>
+        <p:nvPr/>
+      </p:nvGrpSpPr>
+      <p:grpSpPr>
+        <a:xfrm>
+          <a:off x="0" y="0"/>
+          <a:ext cx="0" cy="0"/>
+          <a:chOff x="0" y="0"/>
+          <a:chExt cx="0" cy="0"/>
+        </a:xfrm>
+      </p:grpSpPr>
+      <p:sp>
+        <p:nvSpPr>
+          <p:cNvPr id="2" name="Title 1"/>
+          <p:cNvSpPr>
+            <a:spLocks noGrp="1"/>
+          </p:cNvSpPr>
+          <p:nvPr>
+            <p:ph type="title"/>
+          </p:nvPr>
+        </p:nvSpPr>
+        <p:spPr/>
+        <p:txBody>
+          <a:bodyPr/>
+          <a:lstStyle/>
+          <a:p>
+            <a:r>
+              <a:rPr lang="en-US" dirty="0" smtClean="0"/>
+              <a:t>Xamarin</a:t>
+            </a:r>
+            <a:endParaRPr lang="en-US" dirty="0"/>
+          </a:p>
+        </p:txBody>
+      </p:sp>
+      <p:sp>
+        <p:nvSpPr>
+          <p:cNvPr id="3" name="Content Placeholder 2"/>
+          <p:cNvSpPr>
+            <a:spLocks noGrp="1"/>
+          </p:cNvSpPr>
+          <p:nvPr>
+            <p:ph idx="1"/>
+          </p:nvPr>
+        </p:nvSpPr>
+        <p:spPr/>
+        <p:txBody>
+          <a:bodyPr/>
+          <a:lstStyle/>
+          <a:p>
+            <a:r>
+              <a:rPr lang="en-US" dirty="0" smtClean="0"/>
+              <a:t>FREE!!! (for all versions </a:t>
+            </a:r>
+            <a:r>
+              <a:rPr lang="en-US" smtClean="0"/>
+              <a:t>of Visual Studio)</a:t>
+            </a:r>
+            <a:endParaRPr lang="en-US" dirty="0" smtClean="0"/>
+          </a:p>
+          <a:p>
+            <a:r>
+              <a:rPr lang="en-US" dirty="0" smtClean="0"/>
+              <a:t>Open Source</a:t>
+            </a:r>
+          </a:p>
+          <a:p>
+            <a:r>
+              <a:rPr lang="en-US" dirty="0" smtClean="0"/>
+              <a:t>MIT License</a:t>
+            </a:r>
+          </a:p>
+          <a:p>
+            <a:r>
+              <a:rPr lang="en-US" dirty="0" smtClean="0"/>
+              <a:t>iOS Emulator for Visual Studio</a:t>
+            </a:r>
+          </a:p>
+          <a:p>
+            <a:endParaRPr lang="en-US" dirty="0"/>
+          </a:p>
+        </p:txBody>
+      </p:sp>
+    </p:spTree>
+    <p:extLst>
+      <p:ext uri="{BB962C8B-B14F-4D97-AF65-F5344CB8AC3E}">
+        <p14:creationId xmlns:p14="http://schemas.microsoft.com/office/powerpoint/2010/main" val="565295118"/>
+      </p:ext>
+    </p:extLst>
+  </p:cSld>
+  <p:clrMapOvr>
+    <a:masterClrMapping/>
+  </p:clrMapOvr>
+</p:sld>
+</file>
+
+<file path=ppt/slides/slide3.xml><?xml version="1.0" encoding="utf-8"?>
+<p:sld xmlns:a="http://schemas.openxmlformats.org/drawingml/2006/main" xmlns:r="http://schemas.openxmlformats.org/officeDocument/2006/relationships" xmlns:p="http://schemas.openxmlformats.org/presentationml/2006/main">
+  <p:cSld>
+    <p:spTree>
+      <p:nvGrpSpPr>
+        <p:cNvPr id="1" name=""/>
+        <p:cNvGrpSpPr/>
+        <p:nvPr/>
+      </p:nvGrpSpPr>
+      <p:grpSpPr>
+        <a:xfrm>
+          <a:off x="0" y="0"/>
+          <a:ext cx="0" cy="0"/>
+          <a:chOff x="0" y="0"/>
+          <a:chExt cx="0" cy="0"/>
+        </a:xfrm>
+      </p:grpSpPr>
+      <p:sp>
+        <p:nvSpPr>
+          <p:cNvPr id="2" name="Title 1"/>
+          <p:cNvSpPr>
+            <a:spLocks noGrp="1"/>
+          </p:cNvSpPr>
+          <p:nvPr>
+            <p:ph type="title"/>
+          </p:nvPr>
+        </p:nvSpPr>
+        <p:spPr/>
+        <p:txBody>
+          <a:bodyPr/>
+          <a:lstStyle/>
+          <a:p>
+            <a:r>
+              <a:rPr lang="en-US" dirty="0" err="1" smtClean="0"/>
+              <a:t>.Net</a:t>
+            </a:r>
+            <a:r>
+              <a:rPr lang="en-US" dirty="0" smtClean="0"/>
+              <a:t> Core</a:t>
+            </a:r>
+            <a:endParaRPr lang="en-US" dirty="0"/>
+          </a:p>
+        </p:txBody>
+      </p:sp>
+      <p:sp>
+        <p:nvSpPr>
+          <p:cNvPr id="3" name="Content Placeholder 2"/>
+          <p:cNvSpPr>
+            <a:spLocks noGrp="1"/>
+          </p:cNvSpPr>
+          <p:nvPr>
+            <p:ph idx="1"/>
+          </p:nvPr>
+        </p:nvSpPr>
+        <p:spPr/>
+        <p:txBody>
+          <a:bodyPr/>
+          <a:lstStyle/>
+          <a:p>
+            <a:endParaRPr lang="en-US"/>
+          </a:p>
+        </p:txBody>
+      </p:sp>
+    </p:spTree>
+    <p:extLst>
+      <p:ext uri="{BB962C8B-B14F-4D97-AF65-F5344CB8AC3E}">
+        <p14:creationId xmlns:p14="http://schemas.microsoft.com/office/powerpoint/2010/main" val="538571293"/>
+      </p:ext>
+    </p:extLst>
+  </p:cSld>
+  <p:clrMapOvr>
+    <a:masterClrMapping/>
+  </p:clrMapOvr>
+</p:sld>
+</file>
+
+<file path=ppt/slides/slide4.xml><?xml version="1.0" encoding="utf-8"?>
+<p:sld xmlns:a="http://schemas.openxmlformats.org/drawingml/2006/main" xmlns:r="http://schemas.openxmlformats.org/officeDocument/2006/relationships" xmlns:p="http://schemas.openxmlformats.org/presentationml/2006/main">
+  <p:cSld>
+    <p:spTree>
+      <p:nvGrpSpPr>
+        <p:cNvPr id="1" name=""/>
+        <p:cNvGrpSpPr/>
+        <p:nvPr/>
+      </p:nvGrpSpPr>
+      <p:grpSpPr>
+        <a:xfrm>
+          <a:off x="0" y="0"/>
+          <a:ext cx="0" cy="0"/>
+          <a:chOff x="0" y="0"/>
+          <a:chExt cx="0" cy="0"/>
+        </a:xfrm>
+      </p:grpSpPr>
+      <p:sp>
+        <p:nvSpPr>
+          <p:cNvPr id="2" name="Title 1"/>
+          <p:cNvSpPr>
+            <a:spLocks noGrp="1"/>
+          </p:cNvSpPr>
+          <p:nvPr>
+            <p:ph type="title"/>
+          </p:nvPr>
+        </p:nvSpPr>
+        <p:spPr/>
+        <p:txBody>
+          <a:bodyPr/>
+          <a:lstStyle/>
+          <a:p>
+            <a:r>
+              <a:rPr lang="en-US" dirty="0" smtClean="0"/>
+              <a:t>Bots!</a:t>
+            </a:r>
+            <a:endParaRPr lang="en-US" dirty="0"/>
+          </a:p>
+        </p:txBody>
+      </p:sp>
+      <p:sp>
+        <p:nvSpPr>
+          <p:cNvPr id="3" name="Content Placeholder 2"/>
+          <p:cNvSpPr>
+            <a:spLocks noGrp="1"/>
+          </p:cNvSpPr>
+          <p:nvPr>
+            <p:ph idx="1"/>
+          </p:nvPr>
+        </p:nvSpPr>
+        <p:spPr/>
+        <p:txBody>
+          <a:bodyPr/>
+          <a:lstStyle/>
+          <a:p>
+            <a:r>
+              <a:rPr lang="en-US" dirty="0" smtClean="0"/>
+              <a:t>Conversation as a platform</a:t>
+            </a:r>
+            <a:endParaRPr lang="en-US" dirty="0"/>
+          </a:p>
+        </p:txBody>
+      </p:sp>
+    </p:spTree>
+    <p:extLst>
+      <p:ext uri="{BB962C8B-B14F-4D97-AF65-F5344CB8AC3E}">
+        <p14:creationId xmlns:p14="http://schemas.microsoft.com/office/powerpoint/2010/main" val="3373408228"/>
+      </p:ext>
+    </p:extLst>
+  </p:cSld>
+  <p:clrMapOvr>
+    <a:masterClrMapping/>
+  </p:clrMapOvr>
+</p:sld>
+</file>
+
+<file path=ppt/slides/slide5.xml><?xml version="1.0" encoding="utf-8"?>
+<p:sld xmlns:a="http://schemas.openxmlformats.org/drawingml/2006/main" xmlns:r="http://schemas.openxmlformats.org/officeDocument/2006/relationships" xmlns:p="http://schemas.openxmlformats.org/presentationml/2006/main">
+  <p:cSld>
+    <p:spTree>
+      <p:nvGrpSpPr>
+        <p:cNvPr id="1" name=""/>
+        <p:cNvGrpSpPr/>
+        <p:nvPr/>
+      </p:nvGrpSpPr>
+      <p:grpSpPr>
+        <a:xfrm>
+          <a:off x="0" y="0"/>
+          <a:ext cx="0" cy="0"/>
+          <a:chOff x="0" y="0"/>
+          <a:chExt cx="0" cy="0"/>
+        </a:xfrm>
+      </p:grpSpPr>
+      <p:sp>
+        <p:nvSpPr>
+          <p:cNvPr id="2" name="Title 1"/>
+          <p:cNvSpPr>
+            <a:spLocks noGrp="1"/>
+          </p:cNvSpPr>
+          <p:nvPr>
+            <p:ph type="title"/>
+          </p:nvPr>
+        </p:nvSpPr>
+        <p:spPr/>
+        <p:txBody>
+          <a:bodyPr/>
+          <a:lstStyle/>
+          <a:p>
+            <a:r>
+              <a:rPr lang="en-US" dirty="0" smtClean="0"/>
+              <a:t>Azure</a:t>
+            </a:r>
+            <a:endParaRPr lang="en-US" dirty="0"/>
+          </a:p>
+        </p:txBody>
+      </p:sp>
+      <p:sp>
+        <p:nvSpPr>
+          <p:cNvPr id="3" name="Content Placeholder 2"/>
+          <p:cNvSpPr>
+            <a:spLocks noGrp="1"/>
+          </p:cNvSpPr>
+          <p:nvPr>
+            <p:ph idx="1"/>
+          </p:nvPr>
+        </p:nvSpPr>
+        <p:spPr/>
+        <p:txBody>
+          <a:bodyPr/>
+          <a:lstStyle/>
+          <a:p>
+            <a:r>
+              <a:rPr lang="en-US" dirty="0" smtClean="0"/>
+              <a:t>IoT</a:t>
+            </a:r>
+          </a:p>
+          <a:p>
+            <a:r>
+              <a:rPr lang="en-US" dirty="0" smtClean="0"/>
+              <a:t>Service Fabric</a:t>
+            </a:r>
+            <a:endParaRPr lang="en-US" dirty="0"/>
+          </a:p>
+        </p:txBody>
+      </p:sp>
+    </p:spTree>
+    <p:extLst>
+      <p:ext uri="{BB962C8B-B14F-4D97-AF65-F5344CB8AC3E}">
+        <p14:creationId xmlns:p14="http://schemas.microsoft.com/office/powerpoint/2010/main" val="3760621864"/>
+      </p:ext>
+    </p:extLst>
+  </p:cSld>
+  <p:clrMapOvr>
+    <a:masterClrMapping/>
+  </p:clrMapOvr>
+</p:sld>
+</file>
+
+<file path=ppt/slides/slide6.xml><?xml version="1.0" encoding="utf-8"?>
+<p:sld xmlns:a="http://schemas.openxmlformats.org/drawingml/2006/main" xmlns:r="http://schemas.openxmlformats.org/officeDocument/2006/relationships" xmlns:p="http://schemas.openxmlformats.org/presentationml/2006/main">
+  <p:cSld>
+    <p:spTree>
+      <p:nvGrpSpPr>
+        <p:cNvPr id="1" name=""/>
+        <p:cNvGrpSpPr/>
+        <p:nvPr/>
+      </p:nvGrpSpPr>
+      <p:grpSpPr>
+        <a:xfrm>
+          <a:off x="0" y="0"/>
+          <a:ext cx="0" cy="0"/>
+          <a:chOff x="0" y="0"/>
+          <a:chExt cx="0" cy="0"/>
+        </a:xfrm>
+      </p:grpSpPr>
+      <p:sp>
+        <p:nvSpPr>
+          <p:cNvPr id="2" name="Title 1"/>
+          <p:cNvSpPr>
+            <a:spLocks noGrp="1"/>
+          </p:cNvSpPr>
+          <p:nvPr>
+            <p:ph type="title"/>
+          </p:nvPr>
+        </p:nvSpPr>
+        <p:spPr/>
+        <p:txBody>
+          <a:bodyPr/>
+          <a:lstStyle/>
+          <a:p>
+            <a:r>
+              <a:rPr lang="en-US" dirty="0" smtClean="0"/>
+              <a:t>Docker for Windows</a:t>
+            </a:r>
+            <a:endParaRPr lang="en-US" dirty="0"/>
+          </a:p>
+        </p:txBody>
+      </p:sp>
+      <p:sp>
+        <p:nvSpPr>
+          <p:cNvPr id="3" name="Content Placeholder 2"/>
+          <p:cNvSpPr>
+            <a:spLocks noGrp="1"/>
+          </p:cNvSpPr>
+          <p:nvPr>
+            <p:ph idx="1"/>
+          </p:nvPr>
+        </p:nvSpPr>
+        <p:spPr/>
+        <p:txBody>
+          <a:bodyPr/>
+          <a:lstStyle/>
+          <a:p>
+            <a:endParaRPr lang="en-US"/>
+          </a:p>
+        </p:txBody>
+      </p:sp>
+    </p:spTree>
+    <p:extLst>
+      <p:ext uri="{BB962C8B-B14F-4D97-AF65-F5344CB8AC3E}">
+        <p14:creationId xmlns:p14="http://schemas.microsoft.com/office/powerpoint/2010/main" val="1674072649"/>
+      </p:ext>
+    </p:extLst>
+  </p:cSld>
+  <p:clrMapOvr>
+    <a:masterClrMapping/>
+  </p:clrMapOvr>
+</p:sld>
+</file>
+
+<file path=ppt/slides/slide7.xml><?xml version="1.0" encoding="utf-8"?>
+<p:sld xmlns:a="http://schemas.openxmlformats.org/drawingml/2006/main" xmlns:r="http://schemas.openxmlformats.org/officeDocument/2006/relationships" xmlns:p="http://schemas.openxmlformats.org/presentationml/2006/main">
+  <p:cSld>
+    <p:spTree>
+      <p:nvGrpSpPr>
+        <p:cNvPr id="1" name=""/>
+        <p:cNvGrpSpPr/>
+        <p:nvPr/>
+      </p:nvGrpSpPr>
+      <p:grpSpPr>
+        <a:xfrm>
+          <a:off x="0" y="0"/>
+          <a:ext cx="0" cy="0"/>
+          <a:chOff x="0" y="0"/>
+          <a:chExt cx="0" cy="0"/>
+        </a:xfrm>
+      </p:grpSpPr>
+      <p:sp>
+        <p:nvSpPr>
+          <p:cNvPr id="2" name="Title 1"/>
+          <p:cNvSpPr>
+            <a:spLocks noGrp="1"/>
+          </p:cNvSpPr>
+          <p:nvPr>
+            <p:ph type="title"/>
+          </p:nvPr>
+        </p:nvSpPr>
+        <p:spPr/>
+        <p:txBody>
+          <a:bodyPr/>
+          <a:lstStyle/>
+          <a:p>
+            <a:r>
+              <a:rPr lang="en-US" dirty="0" smtClean="0"/>
+              <a:t>Windows 10 Anniversary</a:t>
+            </a:r>
+            <a:endParaRPr lang="en-US" dirty="0"/>
+          </a:p>
+        </p:txBody>
+      </p:sp>
+      <p:sp>
+        <p:nvSpPr>
+          <p:cNvPr id="3" name="Content Placeholder 2"/>
+          <p:cNvSpPr>
+            <a:spLocks noGrp="1"/>
+          </p:cNvSpPr>
+          <p:nvPr>
+            <p:ph idx="1"/>
+          </p:nvPr>
+        </p:nvSpPr>
+        <p:spPr/>
+        <p:txBody>
+          <a:bodyPr/>
+          <a:lstStyle/>
+          <a:p>
+            <a:endParaRPr lang="en-US"/>
+          </a:p>
+        </p:txBody>
+      </p:sp>
+    </p:spTree>
+    <p:extLst>
+      <p:ext uri="{BB962C8B-B14F-4D97-AF65-F5344CB8AC3E}">
+        <p14:creationId xmlns:p14="http://schemas.microsoft.com/office/powerpoint/2010/main" val="191137435"/>
+      </p:ext>
+    </p:extLst>
+  </p:cSld>
+  <p:clrMapOvr>
+    <a:masterClrMapping/>
+  </p:clrMapOvr>
+</p:sld>
+</file>
+
+<file path=ppt/slides/slide8.xml><?xml version="1.0" encoding="utf-8"?>
+<p:sld xmlns:a="http://schemas.openxmlformats.org/drawingml/2006/main" xmlns:r="http://schemas.openxmlformats.org/officeDocument/2006/relationships" xmlns:p="http://schemas.openxmlformats.org/presentationml/2006/main">
+  <p:cSld>
+    <p:spTree>
+      <p:nvGrpSpPr>
+        <p:cNvPr id="1" name=""/>
+        <p:cNvGrpSpPr/>
+        <p:nvPr/>
+      </p:nvGrpSpPr>
+      <p:grpSpPr>
+        <a:xfrm>
+          <a:off x="0" y="0"/>
+          <a:ext cx="0" cy="0"/>
+          <a:chOff x="0" y="0"/>
+          <a:chExt cx="0" cy="0"/>
+        </a:xfrm>
+      </p:grpSpPr>
+      <p:sp>
+        <p:nvSpPr>
+          <p:cNvPr id="2" name="Title 1"/>
+          <p:cNvSpPr>
+            <a:spLocks noGrp="1"/>
+          </p:cNvSpPr>
+          <p:nvPr>
+            <p:ph type="title"/>
+          </p:nvPr>
+        </p:nvSpPr>
+        <p:spPr/>
+        <p:txBody>
+          <a:bodyPr/>
+          <a:lstStyle/>
+          <a:p>
+            <a:r>
+              <a:rPr lang="en-US" dirty="0" smtClean="0"/>
+              <a:t>Machine Learning</a:t>
+            </a:r>
+            <a:endParaRPr lang="en-US" dirty="0"/>
+          </a:p>
+        </p:txBody>
+      </p:sp>
+      <p:sp>
+        <p:nvSpPr>
+          <p:cNvPr id="3" name="Content Placeholder 2"/>
+          <p:cNvSpPr>
+            <a:spLocks noGrp="1"/>
+          </p:cNvSpPr>
+          <p:nvPr>
+            <p:ph idx="1"/>
+          </p:nvPr>
+        </p:nvSpPr>
+        <p:spPr/>
+        <p:txBody>
+          <a:bodyPr/>
+          <a:lstStyle/>
+          <a:p>
+            <a:r>
+              <a:rPr lang="en-US" dirty="0" smtClean="0"/>
+              <a:t>LUIS</a:t>
+            </a:r>
+          </a:p>
+          <a:p>
+            <a:r>
+              <a:rPr lang="en-US" dirty="0" smtClean="0"/>
+              <a:t>Cortana Intelligence Suite</a:t>
+            </a:r>
+          </a:p>
+          <a:p>
+            <a:r>
+              <a:rPr lang="en-US" dirty="0" smtClean="0"/>
+              <a:t>Cognitive APIs</a:t>
+            </a:r>
+          </a:p>
+          <a:p>
+            <a:r>
+              <a:rPr lang="en-US" dirty="0" smtClean="0"/>
+              <a:t>CRIS</a:t>
+            </a:r>
+            <a:endParaRPr lang="en-US" dirty="0"/>
+          </a:p>
+        </p:txBody>
+      </p:sp>
+    </p:spTree>
+    <p:extLst>
+      <p:ext uri="{BB962C8B-B14F-4D97-AF65-F5344CB8AC3E}">
+        <p14:creationId xmlns:p14="http://schemas.microsoft.com/office/powerpoint/2010/main" val="3795182481"/>
+      </p:ext>
+    </p:extLst>
+  </p:cSld>
+  <p:clrMapOvr>
+    <a:masterClrMapping/>
+  </p:clrMapOvr>
+</p:sld>
+</file>
+
+<file path=ppt/slides/slide9.xml><?xml version="1.0" encoding="utf-8"?>
+<p:sld xmlns:a="http://schemas.openxmlformats.org/drawingml/2006/main" xmlns:r="http://schemas.openxmlformats.org/officeDocument/2006/relationships" xmlns:p="http://schemas.openxmlformats.org/presentationml/2006/main">
+  <p:cSld>
+    <p:spTree>
+      <p:nvGrpSpPr>
+        <p:cNvPr id="1" name=""/>
+        <p:cNvGrpSpPr/>
+        <p:nvPr/>
+      </p:nvGrpSpPr>
+      <p:grpSpPr>
+        <a:xfrm>
+          <a:off x="0" y="0"/>
+          <a:ext cx="0" cy="0"/>
+          <a:chOff x="0" y="0"/>
+          <a:chExt cx="0" cy="0"/>
+        </a:xfrm>
+      </p:grpSpPr>
+      <p:sp>
+        <p:nvSpPr>
+          <p:cNvPr id="2" name="Title 1"/>
+          <p:cNvSpPr>
+            <a:spLocks noGrp="1"/>
+          </p:cNvSpPr>
+          <p:nvPr>
+            <p:ph type="title"/>
+          </p:nvPr>
+        </p:nvSpPr>
+        <p:spPr/>
+        <p:txBody>
+          <a:bodyPr/>
+          <a:lstStyle/>
+          <a:p>
+            <a:r>
+              <a:rPr lang="en-US" dirty="0" err="1" smtClean="0"/>
+              <a:t>Hololens</a:t>
+            </a:r>
+            <a:endParaRPr lang="en-US" dirty="0"/>
+          </a:p>
+        </p:txBody>
+      </p:sp>
+      <p:sp>
+        <p:nvSpPr>
+          <p:cNvPr id="3" name="Content Placeholder 2"/>
+          <p:cNvSpPr>
+            <a:spLocks noGrp="1"/>
+          </p:cNvSpPr>
+          <p:nvPr>
+            <p:ph idx="1"/>
+          </p:nvPr>
+        </p:nvSpPr>
+        <p:spPr/>
+        <p:txBody>
+          <a:bodyPr/>
+          <a:lstStyle/>
+          <a:p>
+            <a:endParaRPr lang="en-US" dirty="0"/>
+          </a:p>
+        </p:txBody>
+      </p:sp>
+    </p:spTree>
+    <p:extLst>
+      <p:ext uri="{BB962C8B-B14F-4D97-AF65-F5344CB8AC3E}">
+        <p14:creationId xmlns:p14="http://schemas.microsoft.com/office/powerpoint/2010/main" val="4238198090"/>
+      </p:ext>
+    </p:extLst>
+  </p:cSld>
+  <p:clrMapOvr>
+    <a:masterClrMapping/>
+  </p:clrMapOvr>
 </p:sld>
 </file>
 

</xml_diff>